<commit_message>
Commit For Advanced Data Structures And Algorithms
Commit For Advanced Data Structures And Algorithms
</commit_message>
<xml_diff>
--- a/Lecture_01_Activity Selection Problem.pptx
+++ b/Lecture_01_Activity Selection Problem.pptx
@@ -227,7 +227,7 @@
           <a:p>
             <a:fld id="{070A5A99-66FA-47C7-A21F-90047F26158E}" type="datetimeFigureOut">
               <a:rPr lang="en-IN" smtClean="0"/>
-              <a:t>11-12-2020</a:t>
+              <a:t>21-03-2023</a:t>
             </a:fld>
             <a:endParaRPr lang="en-IN"/>
           </a:p>
@@ -721,7 +721,7 @@
           <a:p>
             <a:fld id="{3E6FC92F-7452-40A3-955F-E0DCEFCC011C}" type="datetimeFigureOut">
               <a:rPr lang="en-US" smtClean="0"/>
-              <a:t>12/11/2020</a:t>
+              <a:t>3/21/2023</a:t>
             </a:fld>
             <a:endParaRPr lang="en-US"/>
           </a:p>
@@ -929,7 +929,7 @@
           <a:p>
             <a:fld id="{3E6FC92F-7452-40A3-955F-E0DCEFCC011C}" type="datetimeFigureOut">
               <a:rPr lang="en-US" smtClean="0"/>
-              <a:t>12/11/2020</a:t>
+              <a:t>3/21/2023</a:t>
             </a:fld>
             <a:endParaRPr lang="en-US"/>
           </a:p>
@@ -1185,7 +1185,7 @@
           <a:p>
             <a:fld id="{3E6FC92F-7452-40A3-955F-E0DCEFCC011C}" type="datetimeFigureOut">
               <a:rPr lang="en-US" smtClean="0"/>
-              <a:t>12/11/2020</a:t>
+              <a:t>3/21/2023</a:t>
             </a:fld>
             <a:endParaRPr lang="en-US"/>
           </a:p>
@@ -1359,7 +1359,7 @@
           <a:p>
             <a:fld id="{3E6FC92F-7452-40A3-955F-E0DCEFCC011C}" type="datetimeFigureOut">
               <a:rPr lang="en-US" smtClean="0"/>
-              <a:t>12/11/2020</a:t>
+              <a:t>3/21/2023</a:t>
             </a:fld>
             <a:endParaRPr lang="en-US"/>
           </a:p>
@@ -1702,7 +1702,7 @@
           <a:p>
             <a:fld id="{3E6FC92F-7452-40A3-955F-E0DCEFCC011C}" type="datetimeFigureOut">
               <a:rPr lang="en-US" smtClean="0"/>
-              <a:t>12/11/2020</a:t>
+              <a:t>3/21/2023</a:t>
             </a:fld>
             <a:endParaRPr lang="en-US"/>
           </a:p>
@@ -1977,7 +1977,7 @@
           <a:p>
             <a:fld id="{3E6FC92F-7452-40A3-955F-E0DCEFCC011C}" type="datetimeFigureOut">
               <a:rPr lang="en-US" smtClean="0"/>
-              <a:t>12/11/2020</a:t>
+              <a:t>3/21/2023</a:t>
             </a:fld>
             <a:endParaRPr lang="en-US"/>
           </a:p>
@@ -2356,7 +2356,7 @@
           <a:p>
             <a:fld id="{3E6FC92F-7452-40A3-955F-E0DCEFCC011C}" type="datetimeFigureOut">
               <a:rPr lang="en-US" smtClean="0"/>
-              <a:t>12/11/2020</a:t>
+              <a:t>3/21/2023</a:t>
             </a:fld>
             <a:endParaRPr lang="en-US"/>
           </a:p>
@@ -2474,7 +2474,7 @@
           <a:p>
             <a:fld id="{3E6FC92F-7452-40A3-955F-E0DCEFCC011C}" type="datetimeFigureOut">
               <a:rPr lang="en-US" smtClean="0"/>
-              <a:t>12/11/2020</a:t>
+              <a:t>3/21/2023</a:t>
             </a:fld>
             <a:endParaRPr lang="en-US"/>
           </a:p>
@@ -2645,7 +2645,7 @@
           <a:p>
             <a:fld id="{3E6FC92F-7452-40A3-955F-E0DCEFCC011C}" type="datetimeFigureOut">
               <a:rPr lang="en-US" smtClean="0"/>
-              <a:t>12/11/2020</a:t>
+              <a:t>3/21/2023</a:t>
             </a:fld>
             <a:endParaRPr lang="en-US"/>
           </a:p>
@@ -2999,7 +2999,7 @@
           <a:p>
             <a:fld id="{3E6FC92F-7452-40A3-955F-E0DCEFCC011C}" type="datetimeFigureOut">
               <a:rPr lang="en-US" smtClean="0"/>
-              <a:t>12/11/2020</a:t>
+              <a:t>3/21/2023</a:t>
             </a:fld>
             <a:endParaRPr lang="en-US"/>
           </a:p>
@@ -3381,7 +3381,7 @@
           <a:p>
             <a:fld id="{3E6FC92F-7452-40A3-955F-E0DCEFCC011C}" type="datetimeFigureOut">
               <a:rPr lang="en-US" smtClean="0"/>
-              <a:t>12/11/2020</a:t>
+              <a:t>3/21/2023</a:t>
             </a:fld>
             <a:endParaRPr lang="en-US"/>
           </a:p>
@@ -3668,7 +3668,7 @@
           <a:p>
             <a:fld id="{3E6FC92F-7452-40A3-955F-E0DCEFCC011C}" type="datetimeFigureOut">
               <a:rPr lang="en-US" smtClean="0"/>
-              <a:t>12/11/2020</a:t>
+              <a:t>3/21/2023</a:t>
             </a:fld>
             <a:endParaRPr lang="en-US"/>
           </a:p>
@@ -4246,43 +4246,6 @@
           </a:p>
         </p:txBody>
       </p:sp>
-      <p:sp>
-        <p:nvSpPr>
-          <p:cNvPr id="3" name="Subtitle 2"/>
-          <p:cNvSpPr>
-            <a:spLocks noGrp="1"/>
-          </p:cNvSpPr>
-          <p:nvPr>
-            <p:ph type="subTitle" idx="1"/>
-          </p:nvPr>
-        </p:nvSpPr>
-        <p:spPr>
-          <a:xfrm>
-            <a:off x="2438400" y="4419600"/>
-            <a:ext cx="7543800" cy="1143000"/>
-          </a:xfrm>
-        </p:spPr>
-        <p:txBody>
-          <a:bodyPr>
-            <a:normAutofit/>
-          </a:bodyPr>
-          <a:lstStyle/>
-          <a:p>
-            <a:pPr algn="ctr"/>
-            <a:r>
-              <a:rPr lang="en-US" dirty="0"/>
-              <a:t>Rajesh Kumar Tripathi</a:t>
-            </a:r>
-          </a:p>
-          <a:p>
-            <a:pPr algn="ctr"/>
-            <a:r>
-              <a:rPr lang="en-US" dirty="0"/>
-              <a:t>Assistant Professor, Dept. CEA</a:t>
-            </a:r>
-          </a:p>
-        </p:txBody>
-      </p:sp>
       <p:pic>
         <p:nvPicPr>
           <p:cNvPr id="4" name="Picture 3" descr="Related image"/>
@@ -20804,72 +20767,6 @@
                   </a:srgbClr>
                 </a:outerShdw>
               </a:effectLst>
-            </a:endParaRPr>
-          </a:p>
-        </p:txBody>
-      </p:sp>
-      <p:sp>
-        <p:nvSpPr>
-          <p:cNvPr id="17" name="TextBox 16"/>
-          <p:cNvSpPr txBox="1"/>
-          <p:nvPr/>
-        </p:nvSpPr>
-        <p:spPr>
-          <a:xfrm>
-            <a:off x="6477000" y="3600865"/>
-            <a:ext cx="4343400" cy="1200329"/>
-          </a:xfrm>
-          <a:prstGeom prst="rect">
-            <a:avLst/>
-          </a:prstGeom>
-          <a:noFill/>
-        </p:spPr>
-        <p:txBody>
-          <a:bodyPr wrap="square" rtlCol="0">
-            <a:spAutoFit/>
-          </a:bodyPr>
-          <a:lstStyle/>
-          <a:p>
-            <a:pPr algn="ctr"/>
-            <a:r>
-              <a:rPr lang="en-US" sz="2400" b="1" dirty="0" smtClean="0">
-                <a:solidFill>
-                  <a:schemeClr val="accent5">
-                    <a:lumMod val="75000"/>
-                  </a:schemeClr>
-                </a:solidFill>
-              </a:rPr>
-              <a:t>Complexity of Fractional Knapsack</a:t>
-            </a:r>
-          </a:p>
-          <a:p>
-            <a:pPr algn="ctr"/>
-            <a:r>
-              <a:rPr lang="en-US" sz="2400" b="1" dirty="0">
-                <a:solidFill>
-                  <a:schemeClr val="accent5">
-                    <a:lumMod val="75000"/>
-                  </a:schemeClr>
-                </a:solidFill>
-              </a:rPr>
-              <a:t>?</a:t>
-            </a:r>
-            <a:r>
-              <a:rPr lang="en-US" sz="2400" b="1" dirty="0" smtClean="0">
-                <a:solidFill>
-                  <a:schemeClr val="accent5">
-                    <a:lumMod val="75000"/>
-                  </a:schemeClr>
-                </a:solidFill>
-              </a:rPr>
-              <a:t> </a:t>
-            </a:r>
-            <a:endParaRPr lang="en-IN" sz="2400" b="1" dirty="0">
-              <a:solidFill>
-                <a:schemeClr val="accent5">
-                  <a:lumMod val="75000"/>
-                </a:schemeClr>
-              </a:solidFill>
             </a:endParaRPr>
           </a:p>
         </p:txBody>

</xml_diff>